<commit_message>
add tracking anchor description
</commit_message>
<xml_diff>
--- a/Docs/Images/Diagrams.pptx
+++ b/Docs/Images/Diagrams.pptx
@@ -7,6 +7,7 @@
   <p:sldIdLst>
     <p:sldId id="256" r:id="rId2"/>
     <p:sldId id="257" r:id="rId3"/>
+    <p:sldId id="258" r:id="rId4"/>
   </p:sldIdLst>
   <p:sldSz cx="12192000" cy="6858000"/>
   <p:notesSz cx="6858000" cy="9144000"/>
@@ -5430,6 +5431,500 @@
 </p:sld>
 </file>
 
+<file path=ppt/slides/slide3.xml><?xml version="1.0" encoding="utf-8"?>
+<p:sld xmlns:a="http://schemas.openxmlformats.org/drawingml/2006/main" xmlns:r="http://schemas.openxmlformats.org/officeDocument/2006/relationships" xmlns:p="http://schemas.openxmlformats.org/presentationml/2006/main">
+  <p:cSld>
+    <p:spTree>
+      <p:nvGrpSpPr>
+        <p:cNvPr id="1" name=""/>
+        <p:cNvGrpSpPr/>
+        <p:nvPr/>
+      </p:nvGrpSpPr>
+      <p:grpSpPr>
+        <a:xfrm>
+          <a:off x="0" y="0"/>
+          <a:ext cx="0" cy="0"/>
+          <a:chOff x="0" y="0"/>
+          <a:chExt cx="0" cy="0"/>
+        </a:xfrm>
+      </p:grpSpPr>
+      <p:sp>
+        <p:nvSpPr>
+          <p:cNvPr id="17" name="Rectangle 16">
+            <a:extLst>
+              <a:ext uri="{FF2B5EF4-FFF2-40B4-BE49-F238E27FC236}">
+                <a16:creationId xmlns:a16="http://schemas.microsoft.com/office/drawing/2014/main" id="{79BC3067-30C3-4321-BC0E-F91370C930C8}"/>
+              </a:ext>
+            </a:extLst>
+          </p:cNvPr>
+          <p:cNvSpPr/>
+          <p:nvPr/>
+        </p:nvSpPr>
+        <p:spPr>
+          <a:xfrm>
+            <a:off x="1215956" y="272374"/>
+            <a:ext cx="6780179" cy="6313251"/>
+          </a:xfrm>
+          <a:prstGeom prst="rect">
+            <a:avLst/>
+          </a:prstGeom>
+          <a:solidFill>
+            <a:schemeClr val="bg1"/>
+          </a:solidFill>
+          <a:ln>
+            <a:noFill/>
+          </a:ln>
+        </p:spPr>
+        <p:style>
+          <a:lnRef idx="2">
+            <a:schemeClr val="accent1">
+              <a:shade val="50000"/>
+            </a:schemeClr>
+          </a:lnRef>
+          <a:fillRef idx="1">
+            <a:schemeClr val="accent1"/>
+          </a:fillRef>
+          <a:effectRef idx="0">
+            <a:schemeClr val="accent1"/>
+          </a:effectRef>
+          <a:fontRef idx="minor">
+            <a:schemeClr val="lt1"/>
+          </a:fontRef>
+        </p:style>
+        <p:txBody>
+          <a:bodyPr rtlCol="0" anchor="ctr"/>
+          <a:lstStyle/>
+          <a:p>
+            <a:pPr algn="ctr"/>
+            <a:endParaRPr lang="en-US"/>
+          </a:p>
+        </p:txBody>
+      </p:sp>
+      <p:sp>
+        <p:nvSpPr>
+          <p:cNvPr id="5" name="Rectangle: Rounded Corners 4">
+            <a:extLst>
+              <a:ext uri="{FF2B5EF4-FFF2-40B4-BE49-F238E27FC236}">
+                <a16:creationId xmlns:a16="http://schemas.microsoft.com/office/drawing/2014/main" id="{11DF46EA-A9A2-43B8-80D9-39DE5A3294F3}"/>
+              </a:ext>
+            </a:extLst>
+          </p:cNvPr>
+          <p:cNvSpPr/>
+          <p:nvPr/>
+        </p:nvSpPr>
+        <p:spPr>
+          <a:xfrm>
+            <a:off x="3249038" y="1731523"/>
+            <a:ext cx="2714017" cy="4289898"/>
+          </a:xfrm>
+          <a:prstGeom prst="roundRect">
+            <a:avLst>
+              <a:gd name="adj" fmla="val 50000"/>
+            </a:avLst>
+          </a:prstGeom>
+          <a:solidFill>
+            <a:schemeClr val="accent1"/>
+          </a:solidFill>
+          <a:ln>
+            <a:solidFill>
+              <a:schemeClr val="accent1"/>
+            </a:solidFill>
+          </a:ln>
+        </p:spPr>
+        <p:style>
+          <a:lnRef idx="2">
+            <a:schemeClr val="accent1">
+              <a:shade val="50000"/>
+            </a:schemeClr>
+          </a:lnRef>
+          <a:fillRef idx="1">
+            <a:schemeClr val="accent1"/>
+          </a:fillRef>
+          <a:effectRef idx="0">
+            <a:schemeClr val="accent1"/>
+          </a:effectRef>
+          <a:fontRef idx="minor">
+            <a:schemeClr val="lt1"/>
+          </a:fontRef>
+        </p:style>
+        <p:txBody>
+          <a:bodyPr rtlCol="0" anchor="ctr"/>
+          <a:lstStyle/>
+          <a:p>
+            <a:pPr algn="ctr"/>
+            <a:endParaRPr lang="en-US"/>
+          </a:p>
+        </p:txBody>
+      </p:sp>
+      <p:sp>
+        <p:nvSpPr>
+          <p:cNvPr id="6" name="TextBox 5">
+            <a:extLst>
+              <a:ext uri="{FF2B5EF4-FFF2-40B4-BE49-F238E27FC236}">
+                <a16:creationId xmlns:a16="http://schemas.microsoft.com/office/drawing/2014/main" id="{87663AB9-D6B6-4A84-A9B8-B0D75AF2AA9C}"/>
+              </a:ext>
+            </a:extLst>
+          </p:cNvPr>
+          <p:cNvSpPr txBox="1"/>
+          <p:nvPr/>
+        </p:nvSpPr>
+        <p:spPr>
+          <a:xfrm>
+            <a:off x="3623552" y="1332690"/>
+            <a:ext cx="1964988" cy="369332"/>
+          </a:xfrm>
+          <a:prstGeom prst="rect">
+            <a:avLst/>
+          </a:prstGeom>
+          <a:noFill/>
+        </p:spPr>
+        <p:txBody>
+          <a:bodyPr wrap="square" rtlCol="0">
+            <a:spAutoFit/>
+          </a:bodyPr>
+          <a:lstStyle/>
+          <a:p>
+            <a:pPr algn="ctr"/>
+            <a:r>
+              <a:rPr lang="en-US" b="1" dirty="0">
+                <a:latin typeface="Segoe UI" panose="020B0502040204020203" pitchFamily="34" charset="0"/>
+                <a:cs typeface="Segoe UI" panose="020B0502040204020203" pitchFamily="34" charset="0"/>
+              </a:rPr>
+              <a:t>Nose</a:t>
+            </a:r>
+          </a:p>
+        </p:txBody>
+      </p:sp>
+      <p:sp>
+        <p:nvSpPr>
+          <p:cNvPr id="7" name="TextBox 6">
+            <a:extLst>
+              <a:ext uri="{FF2B5EF4-FFF2-40B4-BE49-F238E27FC236}">
+                <a16:creationId xmlns:a16="http://schemas.microsoft.com/office/drawing/2014/main" id="{31CB66AD-59AD-4B43-9EE7-0AF9CA0A9CE1}"/>
+              </a:ext>
+            </a:extLst>
+          </p:cNvPr>
+          <p:cNvSpPr txBox="1"/>
+          <p:nvPr/>
+        </p:nvSpPr>
+        <p:spPr>
+          <a:xfrm>
+            <a:off x="1556426" y="3691806"/>
+            <a:ext cx="1692612" cy="369332"/>
+          </a:xfrm>
+          <a:prstGeom prst="rect">
+            <a:avLst/>
+          </a:prstGeom>
+          <a:noFill/>
+        </p:spPr>
+        <p:txBody>
+          <a:bodyPr wrap="square" rtlCol="0">
+            <a:spAutoFit/>
+          </a:bodyPr>
+          <a:lstStyle/>
+          <a:p>
+            <a:pPr algn="ctr"/>
+            <a:r>
+              <a:rPr lang="en-US" b="1" dirty="0">
+                <a:latin typeface="Segoe UI" panose="020B0502040204020203" pitchFamily="34" charset="0"/>
+                <a:cs typeface="Segoe UI" panose="020B0502040204020203" pitchFamily="34" charset="0"/>
+              </a:rPr>
+              <a:t>Robot L</a:t>
+            </a:r>
+          </a:p>
+        </p:txBody>
+      </p:sp>
+      <p:sp>
+        <p:nvSpPr>
+          <p:cNvPr id="8" name="TextBox 7">
+            <a:extLst>
+              <a:ext uri="{FF2B5EF4-FFF2-40B4-BE49-F238E27FC236}">
+                <a16:creationId xmlns:a16="http://schemas.microsoft.com/office/drawing/2014/main" id="{62C7B343-6F14-4B93-935E-CB3CB9434E68}"/>
+              </a:ext>
+            </a:extLst>
+          </p:cNvPr>
+          <p:cNvSpPr txBox="1"/>
+          <p:nvPr/>
+        </p:nvSpPr>
+        <p:spPr>
+          <a:xfrm>
+            <a:off x="5963055" y="3691806"/>
+            <a:ext cx="1692612" cy="369332"/>
+          </a:xfrm>
+          <a:prstGeom prst="rect">
+            <a:avLst/>
+          </a:prstGeom>
+          <a:noFill/>
+        </p:spPr>
+        <p:txBody>
+          <a:bodyPr wrap="square" rtlCol="0">
+            <a:spAutoFit/>
+          </a:bodyPr>
+          <a:lstStyle/>
+          <a:p>
+            <a:pPr algn="ctr"/>
+            <a:r>
+              <a:rPr lang="en-US" b="1" dirty="0">
+                <a:latin typeface="Segoe UI" panose="020B0502040204020203" pitchFamily="34" charset="0"/>
+                <a:cs typeface="Segoe UI" panose="020B0502040204020203" pitchFamily="34" charset="0"/>
+              </a:rPr>
+              <a:t>Robot R</a:t>
+            </a:r>
+          </a:p>
+        </p:txBody>
+      </p:sp>
+      <p:sp>
+        <p:nvSpPr>
+          <p:cNvPr id="9" name="TextBox 8">
+            <a:extLst>
+              <a:ext uri="{FF2B5EF4-FFF2-40B4-BE49-F238E27FC236}">
+                <a16:creationId xmlns:a16="http://schemas.microsoft.com/office/drawing/2014/main" id="{AD4011EB-776B-43E5-BBF3-4BC8AAEDB019}"/>
+              </a:ext>
+            </a:extLst>
+          </p:cNvPr>
+          <p:cNvSpPr txBox="1"/>
+          <p:nvPr/>
+        </p:nvSpPr>
+        <p:spPr>
+          <a:xfrm>
+            <a:off x="3623552" y="6050922"/>
+            <a:ext cx="1964988" cy="369332"/>
+          </a:xfrm>
+          <a:prstGeom prst="rect">
+            <a:avLst/>
+          </a:prstGeom>
+          <a:noFill/>
+        </p:spPr>
+        <p:txBody>
+          <a:bodyPr wrap="square" rtlCol="0">
+            <a:spAutoFit/>
+          </a:bodyPr>
+          <a:lstStyle/>
+          <a:p>
+            <a:pPr algn="ctr"/>
+            <a:r>
+              <a:rPr lang="en-US" b="1" dirty="0">
+                <a:latin typeface="Segoe UI" panose="020B0502040204020203" pitchFamily="34" charset="0"/>
+                <a:cs typeface="Segoe UI" panose="020B0502040204020203" pitchFamily="34" charset="0"/>
+              </a:rPr>
+              <a:t>Tail</a:t>
+            </a:r>
+          </a:p>
+        </p:txBody>
+      </p:sp>
+      <p:sp>
+        <p:nvSpPr>
+          <p:cNvPr id="10" name="Oval 9">
+            <a:extLst>
+              <a:ext uri="{FF2B5EF4-FFF2-40B4-BE49-F238E27FC236}">
+                <a16:creationId xmlns:a16="http://schemas.microsoft.com/office/drawing/2014/main" id="{AC2EA5D8-53CF-4C85-98E2-ED962BF87C01}"/>
+              </a:ext>
+            </a:extLst>
+          </p:cNvPr>
+          <p:cNvSpPr/>
+          <p:nvPr/>
+        </p:nvSpPr>
+        <p:spPr>
+          <a:xfrm>
+            <a:off x="4338535" y="2042490"/>
+            <a:ext cx="535022" cy="535022"/>
+          </a:xfrm>
+          <a:prstGeom prst="ellipse">
+            <a:avLst/>
+          </a:prstGeom>
+          <a:solidFill>
+            <a:schemeClr val="bg1"/>
+          </a:solidFill>
+          <a:ln>
+            <a:noFill/>
+          </a:ln>
+        </p:spPr>
+        <p:style>
+          <a:lnRef idx="2">
+            <a:schemeClr val="accent1">
+              <a:shade val="50000"/>
+            </a:schemeClr>
+          </a:lnRef>
+          <a:fillRef idx="1">
+            <a:schemeClr val="accent1"/>
+          </a:fillRef>
+          <a:effectRef idx="0">
+            <a:schemeClr val="accent1"/>
+          </a:effectRef>
+          <a:fontRef idx="minor">
+            <a:schemeClr val="lt1"/>
+          </a:fontRef>
+        </p:style>
+        <p:txBody>
+          <a:bodyPr rtlCol="0" anchor="ctr"/>
+          <a:lstStyle/>
+          <a:p>
+            <a:pPr algn="ctr"/>
+            <a:endParaRPr lang="en-US"/>
+          </a:p>
+        </p:txBody>
+      </p:sp>
+      <p:sp>
+        <p:nvSpPr>
+          <p:cNvPr id="12" name="Oval 11">
+            <a:extLst>
+              <a:ext uri="{FF2B5EF4-FFF2-40B4-BE49-F238E27FC236}">
+                <a16:creationId xmlns:a16="http://schemas.microsoft.com/office/drawing/2014/main" id="{3D412732-C7BD-4B4A-B6F4-99F340D2AB02}"/>
+              </a:ext>
+            </a:extLst>
+          </p:cNvPr>
+          <p:cNvSpPr/>
+          <p:nvPr/>
+        </p:nvSpPr>
+        <p:spPr>
+          <a:xfrm>
+            <a:off x="4873557" y="4444904"/>
+            <a:ext cx="535022" cy="535022"/>
+          </a:xfrm>
+          <a:prstGeom prst="ellipse">
+            <a:avLst/>
+          </a:prstGeom>
+          <a:solidFill>
+            <a:schemeClr val="bg1"/>
+          </a:solidFill>
+          <a:ln>
+            <a:noFill/>
+          </a:ln>
+        </p:spPr>
+        <p:style>
+          <a:lnRef idx="2">
+            <a:schemeClr val="accent1">
+              <a:shade val="50000"/>
+            </a:schemeClr>
+          </a:lnRef>
+          <a:fillRef idx="1">
+            <a:schemeClr val="accent1"/>
+          </a:fillRef>
+          <a:effectRef idx="0">
+            <a:schemeClr val="accent1"/>
+          </a:effectRef>
+          <a:fontRef idx="minor">
+            <a:schemeClr val="lt1"/>
+          </a:fontRef>
+        </p:style>
+        <p:txBody>
+          <a:bodyPr rtlCol="0" anchor="ctr"/>
+          <a:lstStyle/>
+          <a:p>
+            <a:pPr algn="ctr"/>
+            <a:endParaRPr lang="en-US"/>
+          </a:p>
+        </p:txBody>
+      </p:sp>
+      <p:sp>
+        <p:nvSpPr>
+          <p:cNvPr id="13" name="Oval 12">
+            <a:extLst>
+              <a:ext uri="{FF2B5EF4-FFF2-40B4-BE49-F238E27FC236}">
+                <a16:creationId xmlns:a16="http://schemas.microsoft.com/office/drawing/2014/main" id="{6F67419E-0F0C-4777-BAF4-311DBC818589}"/>
+              </a:ext>
+            </a:extLst>
+          </p:cNvPr>
+          <p:cNvSpPr/>
+          <p:nvPr/>
+        </p:nvSpPr>
+        <p:spPr>
+          <a:xfrm>
+            <a:off x="3803513" y="4439564"/>
+            <a:ext cx="535022" cy="535022"/>
+          </a:xfrm>
+          <a:prstGeom prst="ellipse">
+            <a:avLst/>
+          </a:prstGeom>
+          <a:solidFill>
+            <a:schemeClr val="bg1"/>
+          </a:solidFill>
+          <a:ln>
+            <a:noFill/>
+          </a:ln>
+        </p:spPr>
+        <p:style>
+          <a:lnRef idx="2">
+            <a:schemeClr val="accent1">
+              <a:shade val="50000"/>
+            </a:schemeClr>
+          </a:lnRef>
+          <a:fillRef idx="1">
+            <a:schemeClr val="accent1"/>
+          </a:fillRef>
+          <a:effectRef idx="0">
+            <a:schemeClr val="accent1"/>
+          </a:effectRef>
+          <a:fontRef idx="minor">
+            <a:schemeClr val="lt1"/>
+          </a:fontRef>
+        </p:style>
+        <p:txBody>
+          <a:bodyPr rtlCol="0" anchor="ctr"/>
+          <a:lstStyle/>
+          <a:p>
+            <a:pPr algn="ctr"/>
+            <a:endParaRPr lang="en-US"/>
+          </a:p>
+        </p:txBody>
+      </p:sp>
+      <p:cxnSp>
+        <p:nvCxnSpPr>
+          <p:cNvPr id="15" name="Straight Arrow Connector 14">
+            <a:extLst>
+              <a:ext uri="{FF2B5EF4-FFF2-40B4-BE49-F238E27FC236}">
+                <a16:creationId xmlns:a16="http://schemas.microsoft.com/office/drawing/2014/main" id="{3453A800-3894-4040-A4C8-BB95B0D1874C}"/>
+              </a:ext>
+            </a:extLst>
+          </p:cNvPr>
+          <p:cNvCxnSpPr>
+            <a:cxnSpLocks/>
+          </p:cNvCxnSpPr>
+          <p:nvPr/>
+        </p:nvCxnSpPr>
+        <p:spPr>
+          <a:xfrm flipV="1">
+            <a:off x="4606046" y="505838"/>
+            <a:ext cx="0" cy="749031"/>
+          </a:xfrm>
+          <a:prstGeom prst="straightConnector1">
+            <a:avLst/>
+          </a:prstGeom>
+          <a:ln w="38100">
+            <a:solidFill>
+              <a:schemeClr val="tx1"/>
+            </a:solidFill>
+            <a:tailEnd type="triangle"/>
+          </a:ln>
+        </p:spPr>
+        <p:style>
+          <a:lnRef idx="1">
+            <a:schemeClr val="accent1"/>
+          </a:lnRef>
+          <a:fillRef idx="0">
+            <a:schemeClr val="accent1"/>
+          </a:fillRef>
+          <a:effectRef idx="0">
+            <a:schemeClr val="accent1"/>
+          </a:effectRef>
+          <a:fontRef idx="minor">
+            <a:schemeClr val="tx1"/>
+          </a:fontRef>
+        </p:style>
+      </p:cxnSp>
+    </p:spTree>
+    <p:extLst>
+      <p:ext uri="{BB962C8B-B14F-4D97-AF65-F5344CB8AC3E}">
+        <p14:creationId xmlns:p14="http://schemas.microsoft.com/office/powerpoint/2010/main" val="3751147481"/>
+      </p:ext>
+    </p:extLst>
+  </p:cSld>
+  <p:clrMapOvr>
+    <a:masterClrMapping/>
+  </p:clrMapOvr>
+</p:sld>
+</file>
+
 <file path=ppt/theme/theme1.xml><?xml version="1.0" encoding="utf-8"?>
 <a:theme xmlns:a="http://schemas.openxmlformats.org/drawingml/2006/main" name="Office Theme">
   <a:themeElements>

</xml_diff>